<commit_message>
ImNO2017 Poster - Incorporated today's feedback
</commit_message>
<xml_diff>
--- a/ImNO2017/Poster/ChurchSpinalVisualization_v07.pptx
+++ b/ImNO2017/Poster/ChurchSpinalVisualization_v07.pptx
@@ -5552,21 +5552,21 @@
                 <a:gridCol w="2394798">
                   <a:extLst>
                     <a:ext uri="{9D8B030D-6E8A-4147-A177-3AD203B41FA5}">
-                      <a16:colId xmlns:a16="http://schemas.microsoft.com/office/drawing/2014/main" xmlns="" val="20000"/>
+                      <a16:colId xmlns="" xmlns:a16="http://schemas.microsoft.com/office/drawing/2014/main" val="20000"/>
                     </a:ext>
                   </a:extLst>
                 </a:gridCol>
                 <a:gridCol w="2653006">
                   <a:extLst>
                     <a:ext uri="{9D8B030D-6E8A-4147-A177-3AD203B41FA5}">
-                      <a16:colId xmlns:a16="http://schemas.microsoft.com/office/drawing/2014/main" xmlns="" val="20001"/>
+                      <a16:colId xmlns="" xmlns:a16="http://schemas.microsoft.com/office/drawing/2014/main" val="20001"/>
                     </a:ext>
                   </a:extLst>
                 </a:gridCol>
                 <a:gridCol w="2662250">
                   <a:extLst>
                     <a:ext uri="{9D8B030D-6E8A-4147-A177-3AD203B41FA5}">
-                      <a16:colId xmlns:a16="http://schemas.microsoft.com/office/drawing/2014/main" xmlns="" val="20002"/>
+                      <a16:colId xmlns="" xmlns:a16="http://schemas.microsoft.com/office/drawing/2014/main" val="20002"/>
                     </a:ext>
                   </a:extLst>
                 </a:gridCol>
@@ -5795,7 +5795,7 @@
                 </a:tc>
                 <a:extLst>
                   <a:ext uri="{0D108BD9-81ED-4DB2-BD59-A6C34878D82A}">
-                    <a16:rowId xmlns:a16="http://schemas.microsoft.com/office/drawing/2014/main" xmlns="" val="10000"/>
+                    <a16:rowId xmlns="" xmlns:a16="http://schemas.microsoft.com/office/drawing/2014/main" val="10000"/>
                   </a:ext>
                 </a:extLst>
               </a:tr>
@@ -5991,7 +5991,7 @@
                 </a:tc>
                 <a:extLst>
                   <a:ext uri="{0D108BD9-81ED-4DB2-BD59-A6C34878D82A}">
-                    <a16:rowId xmlns:a16="http://schemas.microsoft.com/office/drawing/2014/main" xmlns="" val="10001"/>
+                    <a16:rowId xmlns="" xmlns:a16="http://schemas.microsoft.com/office/drawing/2014/main" val="10001"/>
                   </a:ext>
                 </a:extLst>
               </a:tr>
@@ -6187,7 +6187,7 @@
                 </a:tc>
                 <a:extLst>
                   <a:ext uri="{0D108BD9-81ED-4DB2-BD59-A6C34878D82A}">
-                    <a16:rowId xmlns:a16="http://schemas.microsoft.com/office/drawing/2014/main" xmlns="" val="10002"/>
+                    <a16:rowId xmlns="" xmlns:a16="http://schemas.microsoft.com/office/drawing/2014/main" val="10002"/>
                   </a:ext>
                 </a:extLst>
               </a:tr>
@@ -6383,7 +6383,7 @@
                 </a:tc>
                 <a:extLst>
                   <a:ext uri="{0D108BD9-81ED-4DB2-BD59-A6C34878D82A}">
-                    <a16:rowId xmlns:a16="http://schemas.microsoft.com/office/drawing/2014/main" xmlns="" val="10003"/>
+                    <a16:rowId xmlns="" xmlns:a16="http://schemas.microsoft.com/office/drawing/2014/main" val="10003"/>
                   </a:ext>
                 </a:extLst>
               </a:tr>
@@ -6579,7 +6579,7 @@
                 </a:tc>
                 <a:extLst>
                   <a:ext uri="{0D108BD9-81ED-4DB2-BD59-A6C34878D82A}">
-                    <a16:rowId xmlns:a16="http://schemas.microsoft.com/office/drawing/2014/main" xmlns="" val="10004"/>
+                    <a16:rowId xmlns="" xmlns:a16="http://schemas.microsoft.com/office/drawing/2014/main" val="10004"/>
                   </a:ext>
                 </a:extLst>
               </a:tr>
@@ -6775,7 +6775,7 @@
                 </a:tc>
                 <a:extLst>
                   <a:ext uri="{0D108BD9-81ED-4DB2-BD59-A6C34878D82A}">
-                    <a16:rowId xmlns:a16="http://schemas.microsoft.com/office/drawing/2014/main" xmlns="" val="10005"/>
+                    <a16:rowId xmlns="" xmlns:a16="http://schemas.microsoft.com/office/drawing/2014/main" val="10005"/>
                   </a:ext>
                 </a:extLst>
               </a:tr>
@@ -6841,35 +6841,6 @@
           </a:prstGeom>
         </p:spPr>
       </p:pic>
-      <p:pic>
-        <p:nvPicPr>
-          <p:cNvPr id="9" name="Picture 8"/>
-          <p:cNvPicPr>
-            <a:picLocks noChangeAspect="1"/>
-          </p:cNvPicPr>
-          <p:nvPr/>
-        </p:nvPicPr>
-        <p:blipFill rotWithShape="1">
-          <a:blip r:embed="rId6">
-            <a:extLst>
-              <a:ext uri="{28A0092B-C50C-407E-A947-70E740481C1C}">
-                <a14:useLocalDpi xmlns:a14="http://schemas.microsoft.com/office/drawing/2010/main" val="0"/>
-              </a:ext>
-            </a:extLst>
-          </a:blip>
-          <a:srcRect t="4827" b="9605"/>
-          <a:stretch/>
-        </p:blipFill>
-        <p:spPr>
-          <a:xfrm>
-            <a:off x="1085492" y="26600678"/>
-            <a:ext cx="7362945" cy="9105854"/>
-          </a:xfrm>
-          <a:prstGeom prst="rect">
-            <a:avLst/>
-          </a:prstGeom>
-        </p:spPr>
-      </p:pic>
       <p:sp>
         <p:nvSpPr>
           <p:cNvPr id="67" name="TextBox 66"/>
@@ -6903,68 +6874,6 @@
           </a:p>
         </p:txBody>
       </p:sp>
-      <p:pic>
-        <p:nvPicPr>
-          <p:cNvPr id="11" name="Picture 10"/>
-          <p:cNvPicPr>
-            <a:picLocks noChangeAspect="1"/>
-          </p:cNvPicPr>
-          <p:nvPr/>
-        </p:nvPicPr>
-        <p:blipFill rotWithShape="1">
-          <a:blip r:embed="rId7">
-            <a:extLst>
-              <a:ext uri="{28A0092B-C50C-407E-A947-70E740481C1C}">
-                <a14:useLocalDpi xmlns:a14="http://schemas.microsoft.com/office/drawing/2010/main" val="0"/>
-              </a:ext>
-            </a:extLst>
-          </a:blip>
-          <a:srcRect l="23173" t="7637" r="23173" b="8762"/>
-          <a:stretch/>
-        </p:blipFill>
-        <p:spPr>
-          <a:xfrm>
-            <a:off x="8744698" y="26600678"/>
-            <a:ext cx="7282454" cy="9105854"/>
-          </a:xfrm>
-          <a:prstGeom prst="rect">
-            <a:avLst/>
-          </a:prstGeom>
-        </p:spPr>
-      </p:pic>
-      <p:sp>
-        <p:nvSpPr>
-          <p:cNvPr id="72" name="TextBox 71"/>
-          <p:cNvSpPr txBox="1"/>
-          <p:nvPr/>
-        </p:nvSpPr>
-        <p:spPr>
-          <a:xfrm>
-            <a:off x="1315876" y="35727858"/>
-            <a:ext cx="7039268" cy="1015663"/>
-          </a:xfrm>
-          <a:prstGeom prst="rect">
-            <a:avLst/>
-          </a:prstGeom>
-          <a:noFill/>
-        </p:spPr>
-        <p:txBody>
-          <a:bodyPr wrap="square" rtlCol="0">
-            <a:spAutoFit/>
-          </a:bodyPr>
-          <a:lstStyle/>
-          <a:p>
-            <a:r>
-              <a:rPr lang="en-CA" sz="3000" b="1" dirty="0"/>
-              <a:t>Fig 3.</a:t>
-            </a:r>
-            <a:r>
-              <a:rPr lang="en-CA" sz="3000" dirty="0"/>
-              <a:t> Registration computes transforms displacing model points to patient’s</a:t>
-            </a:r>
-          </a:p>
-        </p:txBody>
-      </p:sp>
       <p:sp>
         <p:nvSpPr>
           <p:cNvPr id="73" name="TextBox 72"/>
@@ -6989,11 +6898,19 @@
           <a:p>
             <a:r>
               <a:rPr lang="en-CA" sz="3000" b="1" dirty="0"/>
-              <a:t>Fig 5.</a:t>
+              <a:t>Fig </a:t>
+            </a:r>
+            <a:r>
+              <a:rPr lang="en-CA" sz="3000" b="1" dirty="0" smtClean="0"/>
+              <a:t>4.</a:t>
+            </a:r>
+            <a:r>
+              <a:rPr lang="en-CA" sz="3000" dirty="0" smtClean="0"/>
+              <a:t> </a:t>
             </a:r>
             <a:r>
               <a:rPr lang="en-CA" sz="3000" dirty="0"/>
-              <a:t> Registrations compared to CT-derived patient ground-truth. Error map shows distance between surfaces from blue (most accurate) to red (least accurate)</a:t>
+              <a:t>Registrations compared to CT-derived patient ground-truth. Error map shows distance between surfaces from blue (most accurate) to red (least accurate)</a:t>
             </a:r>
           </a:p>
         </p:txBody>
@@ -7022,10 +6939,14 @@
           <a:p>
             <a:r>
               <a:rPr lang="en-CA" sz="3000" b="1" dirty="0"/>
-              <a:t>Fig 4.</a:t>
-            </a:r>
-            <a:r>
-              <a:rPr lang="en-CA" sz="3000" dirty="0"/>
+              <a:t>Fig </a:t>
+            </a:r>
+            <a:r>
+              <a:rPr lang="en-CA" sz="3000" b="1" dirty="0" smtClean="0"/>
+              <a:t>3.</a:t>
+            </a:r>
+            <a:r>
+              <a:rPr lang="en-CA" sz="3000" dirty="0" smtClean="0"/>
               <a:t> </a:t>
             </a:r>
             <a:r>
@@ -7045,7 +6966,7 @@
           <p:nvPr/>
         </p:nvPicPr>
         <p:blipFill>
-          <a:blip r:embed="rId8" cstate="print">
+          <a:blip r:embed="rId6" cstate="print">
             <a:extLst>
               <a:ext uri="{28A0092B-C50C-407E-A947-70E740481C1C}">
                 <a14:useLocalDpi xmlns:a14="http://schemas.microsoft.com/office/drawing/2010/main" val="0"/>
@@ -7083,7 +7004,7 @@
           <p:nvPr/>
         </p:nvPicPr>
         <p:blipFill>
-          <a:blip r:embed="rId9" cstate="print">
+          <a:blip r:embed="rId7" cstate="print">
             <a:extLst>
               <a:ext uri="{28A0092B-C50C-407E-A947-70E740481C1C}">
                 <a14:useLocalDpi xmlns:a14="http://schemas.microsoft.com/office/drawing/2010/main" val="0"/>
@@ -7121,7 +7042,7 @@
           <p:nvPr/>
         </p:nvPicPr>
         <p:blipFill>
-          <a:blip r:embed="rId10">
+          <a:blip r:embed="rId8">
             <a:extLst>
               <a:ext uri="{28A0092B-C50C-407E-A947-70E740481C1C}">
                 <a14:useLocalDpi xmlns:a14="http://schemas.microsoft.com/office/drawing/2010/main" val="0"/>
@@ -7162,7 +7083,7 @@
           <p:nvPr/>
         </p:nvPicPr>
         <p:blipFill rotWithShape="1">
-          <a:blip r:embed="rId11">
+          <a:blip r:embed="rId9">
             <a:extLst>
               <a:ext uri="{28A0092B-C50C-407E-A947-70E740481C1C}">
                 <a14:useLocalDpi xmlns:a14="http://schemas.microsoft.com/office/drawing/2010/main" val="0"/>
@@ -7176,6 +7097,35 @@
           <a:xfrm>
             <a:off x="26292260" y="37347736"/>
             <a:ext cx="4396111" cy="2571959"/>
+          </a:xfrm>
+          <a:prstGeom prst="rect">
+            <a:avLst/>
+          </a:prstGeom>
+        </p:spPr>
+      </p:pic>
+      <p:pic>
+        <p:nvPicPr>
+          <p:cNvPr id="12" name="Picture 11"/>
+          <p:cNvPicPr>
+            <a:picLocks noChangeAspect="1"/>
+          </p:cNvPicPr>
+          <p:nvPr/>
+        </p:nvPicPr>
+        <p:blipFill rotWithShape="1">
+          <a:blip r:embed="rId10">
+            <a:extLst>
+              <a:ext uri="{28A0092B-C50C-407E-A947-70E740481C1C}">
+                <a14:useLocalDpi xmlns:a14="http://schemas.microsoft.com/office/drawing/2010/main" val="0"/>
+              </a:ext>
+            </a:extLst>
+          </a:blip>
+          <a:srcRect l="18707" t="4737" r="15099" b="4737"/>
+          <a:stretch/>
+        </p:blipFill>
+        <p:spPr>
+          <a:xfrm>
+            <a:off x="7440832" y="26538473"/>
+            <a:ext cx="8586320" cy="9218374"/>
           </a:xfrm>
           <a:prstGeom prst="rect">
             <a:avLst/>

</xml_diff>